<commit_message>
Fix Selection vs Bubble Sort
</commit_message>
<xml_diff>
--- a/MOD02_Algoritmos_de_ordenamiento_y_busqueda/01 Presentacion/INFO2_MOD2-Ordenamiento_y_Busqueda.pptx
+++ b/MOD02_Algoritmos_de_ordenamiento_y_busqueda/01 Presentacion/INFO2_MOD2-Ordenamiento_y_Busqueda.pptx
@@ -263,7 +263,7 @@
           <a:p>
             <a:fld id="{502DC4F2-4218-4162-BA3D-B14DE8F619FF}" type="datetimeFigureOut">
               <a:rPr lang="en-US" smtClean="0"/>
-              <a:t>1/26/2020</a:t>
+              <a:t>1/28/2020</a:t>
             </a:fld>
             <a:endParaRPr lang="en-US"/>
           </a:p>
@@ -13940,7 +13940,7 @@
             <a:pPr eaLnBrk="1" hangingPunct="1"/>
             <a:r>
               <a:rPr lang="en-US" altLang="en-US" sz="3000" dirty="0"/>
-              <a:t>Selection sort </a:t>
+              <a:t>Bubble Sort </a:t>
             </a:r>
             <a:r>
               <a:rPr lang="en-US" altLang="en-US" sz="3000" dirty="0" err="1"/>

</xml_diff>